<commit_message>
updated story board image and added place holder for github interaction utils
</commit_message>
<xml_diff>
--- a/img/StoryBoard.pptx
+++ b/img/StoryBoard.pptx
@@ -4534,7 +4534,7 @@
         </p:nvSpPr>
         <p:spPr>
           <a:xfrm>
-            <a:off x="705182" y="5117757"/>
+            <a:off x="640849" y="7214616"/>
             <a:ext cx="4180243" cy="646331"/>
           </a:xfrm>
           <a:prstGeom prst="rect">
@@ -4597,6 +4597,120 @@
           <a:xfrm>
             <a:off x="2346356" y="4281399"/>
             <a:ext cx="0" cy="801093"/>
+          </a:xfrm>
+          <a:prstGeom prst="straightConnector1">
+            <a:avLst/>
+          </a:prstGeom>
+          <a:ln w="38100">
+            <a:tailEnd type="triangle"/>
+          </a:ln>
+        </p:spPr>
+        <p:style>
+          <a:lnRef idx="1">
+            <a:schemeClr val="accent1"/>
+          </a:lnRef>
+          <a:fillRef idx="0">
+            <a:schemeClr val="accent1"/>
+          </a:fillRef>
+          <a:effectRef idx="0">
+            <a:schemeClr val="accent1"/>
+          </a:effectRef>
+          <a:fontRef idx="minor">
+            <a:schemeClr val="tx1"/>
+          </a:fontRef>
+        </p:style>
+      </p:cxnSp>
+      <p:sp>
+        <p:nvSpPr>
+          <p:cNvPr id="76" name="TextBox 75">
+            <a:extLst>
+              <a:ext uri="{FF2B5EF4-FFF2-40B4-BE49-F238E27FC236}">
+                <a16:creationId xmlns:a16="http://schemas.microsoft.com/office/drawing/2014/main" id="{F0A8D8B5-1D08-8246-BDE7-2A6627F39ADA}"/>
+              </a:ext>
+            </a:extLst>
+          </p:cNvPr>
+          <p:cNvSpPr txBox="1"/>
+          <p:nvPr/>
+        </p:nvSpPr>
+        <p:spPr>
+          <a:xfrm>
+            <a:off x="593185" y="5224272"/>
+            <a:ext cx="4180243" cy="1477328"/>
+          </a:xfrm>
+          <a:prstGeom prst="rect">
+            <a:avLst/>
+          </a:prstGeom>
+          <a:noFill/>
+          <a:ln>
+            <a:solidFill>
+              <a:schemeClr val="accent1">
+                <a:shade val="50000"/>
+              </a:schemeClr>
+            </a:solidFill>
+          </a:ln>
+        </p:spPr>
+        <p:txBody>
+          <a:bodyPr wrap="square" rtlCol="0">
+            <a:spAutoFit/>
+          </a:bodyPr>
+          <a:lstStyle/>
+          <a:p>
+            <a:pPr marL="800100" lvl="1" indent="-342900">
+              <a:buFont typeface="+mj-lt"/>
+              <a:buAutoNum type="arabicPeriod"/>
+            </a:pPr>
+            <a:r>
+              <a:rPr lang="en-US" dirty="0"/>
+              <a:t>Definition</a:t>
+            </a:r>
+          </a:p>
+          <a:p>
+            <a:pPr marL="800100" lvl="1" indent="-342900">
+              <a:buFont typeface="+mj-lt"/>
+              <a:buAutoNum type="arabicPeriod"/>
+            </a:pPr>
+            <a:r>
+              <a:rPr lang="en-US" dirty="0"/>
+              <a:t>Units</a:t>
+            </a:r>
+          </a:p>
+          <a:p>
+            <a:pPr marL="800100" lvl="1" indent="-342900">
+              <a:buFont typeface="+mj-lt"/>
+              <a:buAutoNum type="arabicPeriod"/>
+            </a:pPr>
+            <a:r>
+              <a:rPr lang="en-US" dirty="0"/>
+              <a:t>….</a:t>
+            </a:r>
+          </a:p>
+          <a:p>
+            <a:pPr lvl="1"/>
+            <a:r>
+              <a:rPr lang="en-US" dirty="0"/>
+              <a:t>(user) Select properties to include in table [1-3]: </a:t>
+            </a:r>
+          </a:p>
+        </p:txBody>
+      </p:sp>
+      <p:cxnSp>
+        <p:nvCxnSpPr>
+          <p:cNvPr id="77" name="Straight Arrow Connector 76">
+            <a:extLst>
+              <a:ext uri="{FF2B5EF4-FFF2-40B4-BE49-F238E27FC236}">
+                <a16:creationId xmlns:a16="http://schemas.microsoft.com/office/drawing/2014/main" id="{BB7A7326-78B6-ED4F-A625-122839EC3C0A}"/>
+              </a:ext>
+            </a:extLst>
+          </p:cNvPr>
+          <p:cNvCxnSpPr>
+            <a:cxnSpLocks/>
+          </p:cNvCxnSpPr>
+          <p:nvPr/>
+        </p:nvCxnSpPr>
+        <p:spPr>
+          <a:xfrm>
+            <a:off x="2346356" y="6701600"/>
+            <a:ext cx="0" cy="554750"/>
           </a:xfrm>
           <a:prstGeom prst="straightConnector1">
             <a:avLst/>

</xml_diff>

<commit_message>
updated imports to automatically install pynidm tools
</commit_message>
<xml_diff>
--- a/img/StoryBoard.pptx
+++ b/img/StoryBoard.pptx
@@ -4535,7 +4535,7 @@
         <p:spPr>
           <a:xfrm>
             <a:off x="640849" y="7214616"/>
-            <a:ext cx="4180243" cy="646331"/>
+            <a:ext cx="4180243" cy="923330"/>
           </a:xfrm>
           <a:prstGeom prst="rect">
             <a:avLst/>
@@ -4560,8 +4560,12 @@
               <a:buChar char="•"/>
             </a:pPr>
             <a:r>
+              <a:rPr lang="en-US"/>
+              <a:t>Create Markdown </a:t>
+            </a:r>
+            <a:r>
               <a:rPr lang="en-US" dirty="0"/>
-              <a:t>Create PDF table of selected terms</a:t>
+              <a:t>table of selected terms</a:t>
             </a:r>
           </a:p>
           <a:p>

</xml_diff>